<commit_message>
slide added to pptx showing example of search page
</commit_message>
<xml_diff>
--- a/Project2-WebScraping/williambest_p2/BGG Analysis.pptx
+++ b/Project2-WebScraping/williambest_p2/BGG Analysis.pptx
@@ -17,23 +17,24 @@
     <p:sldId id="262" r:id="rId11"/>
     <p:sldId id="263" r:id="rId12"/>
     <p:sldId id="264" r:id="rId13"/>
+    <p:sldId id="265" r:id="rId14"/>
   </p:sldIdLst>
   <p:sldSz cy="5143500" cx="9144000"/>
   <p:notesSz cx="6858000" cy="9144000"/>
   <p:embeddedFontLst>
     <p:embeddedFont>
       <p:font typeface="Playfair Display"/>
-      <p:regular r:id="rId14"/>
-      <p:bold r:id="rId15"/>
-      <p:italic r:id="rId16"/>
-      <p:boldItalic r:id="rId17"/>
+      <p:regular r:id="rId15"/>
+      <p:bold r:id="rId16"/>
+      <p:italic r:id="rId17"/>
+      <p:boldItalic r:id="rId18"/>
     </p:embeddedFont>
     <p:embeddedFont>
       <p:font typeface="Lato"/>
-      <p:regular r:id="rId18"/>
-      <p:bold r:id="rId19"/>
-      <p:italic r:id="rId20"/>
-      <p:boldItalic r:id="rId21"/>
+      <p:regular r:id="rId19"/>
+      <p:bold r:id="rId20"/>
+      <p:italic r:id="rId21"/>
+      <p:boldItalic r:id="rId22"/>
     </p:embeddedFont>
   </p:embeddedFontLst>
   <p:defaultTextStyle>
@@ -485,6 +486,113 @@
 </p:notes>
 </file>
 
+<file path=ppt/notesSlides/notesSlide10.xml><?xml version="1.0" encoding="utf-8"?>
+<p:notes xmlns:a="http://schemas.openxmlformats.org/drawingml/2006/main" xmlns:r="http://schemas.openxmlformats.org/officeDocument/2006/relationships" xmlns:mc="http://schemas.openxmlformats.org/markup-compatibility/2006" xmlns:mv="urn:schemas-microsoft-com:mac:vml" xmlns:p="http://schemas.openxmlformats.org/presentationml/2006/main" xmlns:c="http://schemas.openxmlformats.org/drawingml/2006/chart" xmlns:dgm="http://schemas.openxmlformats.org/drawingml/2006/diagram" xmlns:o="urn:schemas-microsoft-com:office:office" xmlns:v="urn:schemas-microsoft-com:vml" xmlns:pvml="urn:schemas-microsoft-com:office:powerpoint" xmlns:com="http://schemas.openxmlformats.org/drawingml/2006/compatibility" xmlns:p14="http://schemas.microsoft.com/office/powerpoint/2010/main" showMasterPhAnim="0" showMasterSp="0">
+  <p:cSld>
+    <p:spTree>
+      <p:nvGrpSpPr>
+        <p:cNvPr id="109" name="Shape 109"/>
+        <p:cNvGrpSpPr/>
+        <p:nvPr/>
+      </p:nvGrpSpPr>
+      <p:grpSpPr>
+        <a:xfrm>
+          <a:off x="0" y="0"/>
+          <a:ext cx="0" cy="0"/>
+          <a:chOff x="0" y="0"/>
+          <a:chExt cx="0" cy="0"/>
+        </a:xfrm>
+      </p:grpSpPr>
+      <p:sp>
+        <p:nvSpPr>
+          <p:cNvPr id="110" name="Shape 110"/>
+          <p:cNvSpPr/>
+          <p:nvPr>
+            <p:ph idx="2" type="sldImg"/>
+          </p:nvPr>
+        </p:nvSpPr>
+        <p:spPr>
+          <a:xfrm>
+            <a:off x="381300" y="685800"/>
+            <a:ext cx="6096000" cy="3429000"/>
+          </a:xfrm>
+          <a:custGeom>
+            <a:pathLst>
+              <a:path extrusionOk="0" h="120000" w="120000">
+                <a:moveTo>
+                  <a:pt x="0" y="0"/>
+                </a:moveTo>
+                <a:lnTo>
+                  <a:pt x="120000" y="0"/>
+                </a:lnTo>
+                <a:lnTo>
+                  <a:pt x="120000" y="120000"/>
+                </a:lnTo>
+                <a:lnTo>
+                  <a:pt x="0" y="120000"/>
+                </a:lnTo>
+                <a:close/>
+              </a:path>
+            </a:pathLst>
+          </a:custGeom>
+        </p:spPr>
+      </p:sp>
+      <p:sp>
+        <p:nvSpPr>
+          <p:cNvPr id="111" name="Shape 111"/>
+          <p:cNvSpPr txBox="1"/>
+          <p:nvPr>
+            <p:ph idx="1" type="body"/>
+          </p:nvPr>
+        </p:nvSpPr>
+        <p:spPr>
+          <a:xfrm>
+            <a:off x="685800" y="4343400"/>
+            <a:ext cx="5486400" cy="4114800"/>
+          </a:xfrm>
+          <a:prstGeom prst="rect">
+            <a:avLst/>
+          </a:prstGeom>
+        </p:spPr>
+        <p:txBody>
+          <a:bodyPr anchorCtr="0" anchor="t" bIns="91425" lIns="91425" rIns="91425" tIns="91425">
+            <a:noAutofit/>
+          </a:bodyPr>
+          <a:lstStyle/>
+          <a:p>
+            <a:pPr lvl="0">
+              <a:spcBef>
+                <a:spcPts val="0"/>
+              </a:spcBef>
+              <a:buNone/>
+            </a:pPr>
+            <a:r>
+              <a:rPr lang="en"/>
+              <a:t>How often people get rid of games, either through sale trade etc</a:t>
+            </a:r>
+          </a:p>
+          <a:p>
+            <a:pPr lvl="0">
+              <a:spcBef>
+                <a:spcPts val="0"/>
+              </a:spcBef>
+              <a:buNone/>
+            </a:pPr>
+            <a:r>
+              <a:rPr lang="en"/>
+              <a:t>This information was from own vs prev-owned</a:t>
+            </a:r>
+          </a:p>
+        </p:txBody>
+      </p:sp>
+    </p:spTree>
+  </p:cSld>
+  <p:clrMapOvr>
+    <a:masterClrMapping/>
+  </p:clrMapOvr>
+</p:notes>
+</file>
+
 <file path=ppt/notesSlides/notesSlide2.xml><?xml version="1.0" encoding="utf-8"?>
 <p:notes xmlns:a="http://schemas.openxmlformats.org/drawingml/2006/main" xmlns:r="http://schemas.openxmlformats.org/officeDocument/2006/relationships" xmlns:mc="http://schemas.openxmlformats.org/markup-compatibility/2006" xmlns:mv="urn:schemas-microsoft-com:mac:vml" xmlns:p="http://schemas.openxmlformats.org/presentationml/2006/main" xmlns:c="http://schemas.openxmlformats.org/drawingml/2006/chart" xmlns:dgm="http://schemas.openxmlformats.org/drawingml/2006/diagram" xmlns:o="urn:schemas-microsoft-com:office:office" xmlns:v="urn:schemas-microsoft-com:vml" xmlns:pvml="urn:schemas-microsoft-com:office:powerpoint" xmlns:com="http://schemas.openxmlformats.org/drawingml/2006/compatibility" xmlns:p14="http://schemas.microsoft.com/office/powerpoint/2010/main" showMasterPhAnim="0" showMasterSp="0">
   <p:cSld>
@@ -654,16 +762,16 @@
           </a:bodyPr>
           <a:lstStyle/>
           <a:p>
-            <a:pPr lvl="0">
+            <a:pPr lvl="0" rtl="0">
               <a:spcBef>
                 <a:spcPts val="0"/>
               </a:spcBef>
               <a:buNone/>
             </a:pPr>
             <a:r>
-              <a:rPr lang="en"/>
-              <a:t>“Game” features like these have little bearing on rank, # Expansions looks like it might, but it’s probably the reverse. The popular game has more expansions</a:t>
+              <a:t/>
             </a:r>
+            <a:endParaRPr/>
           </a:p>
         </p:txBody>
       </p:sp>
@@ -757,7 +865,7 @@
             </a:pPr>
             <a:r>
               <a:rPr lang="en"/>
-              <a:t>Geek Rating is strongly correlated with Rank, this stands to reason as it is how rank is determined.</a:t>
+              <a:t>“Game” features like these have little bearing on rank, # Expansions looks like it might, but it’s probably the reverse. The popular game has more expansions</a:t>
             </a:r>
           </a:p>
         </p:txBody>
@@ -852,19 +960,7 @@
             </a:pPr>
             <a:r>
               <a:rPr lang="en"/>
-              <a:t>If we take the log of the “num” variables, they become much more strongly correlated</a:t>
-            </a:r>
-          </a:p>
-          <a:p>
-            <a:pPr lvl="0" rtl="0">
-              <a:spcBef>
-                <a:spcPts val="0"/>
-              </a:spcBef>
-              <a:buNone/>
-            </a:pPr>
-            <a:r>
-              <a:rPr lang="en"/>
-              <a:t>Using this method, the best non-rating element is Votes</a:t>
+              <a:t>Geek Rating is strongly correlated with Rank, this stands to reason as it is how rank is determined.</a:t>
             </a:r>
           </a:p>
         </p:txBody>
@@ -959,7 +1055,19 @@
             </a:pPr>
             <a:r>
               <a:rPr lang="en"/>
-              <a:t>Again, visible here is the strong correlation between # Votes, # Comments, and Rank</a:t>
+              <a:t>If we take the log of the “num” variables, they become much more strongly correlated</a:t>
+            </a:r>
+          </a:p>
+          <a:p>
+            <a:pPr lvl="0" rtl="0">
+              <a:spcBef>
+                <a:spcPts val="0"/>
+              </a:spcBef>
+              <a:buNone/>
+            </a:pPr>
+            <a:r>
+              <a:rPr lang="en"/>
+              <a:t>Using this method, the best non-rating element is Votes</a:t>
             </a:r>
           </a:p>
         </p:txBody>
@@ -1054,55 +1162,7 @@
             </a:pPr>
             <a:r>
               <a:rPr lang="en"/>
-              <a:t>Ran two-sample t.test against rest of games for each category</a:t>
-            </a:r>
-          </a:p>
-          <a:p>
-            <a:pPr lvl="0">
-              <a:spcBef>
-                <a:spcPts val="0"/>
-              </a:spcBef>
-              <a:buNone/>
-            </a:pPr>
-            <a:r>
-              <a:rPr lang="en"/>
-              <a:t>War games not likely to get more fans, votes, or comments than average despite higher ratings</a:t>
-            </a:r>
-          </a:p>
-          <a:p>
-            <a:pPr lvl="0">
-              <a:spcBef>
-                <a:spcPts val="0"/>
-              </a:spcBef>
-              <a:buNone/>
-            </a:pPr>
-            <a:r>
-              <a:rPr lang="en"/>
-              <a:t>Building includes economic games and political games, where you “build up” something</a:t>
-            </a:r>
-          </a:p>
-          <a:p>
-            <a:pPr lvl="0">
-              <a:spcBef>
-                <a:spcPts val="0"/>
-              </a:spcBef>
-              <a:buNone/>
-            </a:pPr>
-            <a:r>
-              <a:t/>
-            </a:r>
-            <a:endParaRPr/>
-          </a:p>
-          <a:p>
-            <a:pPr lvl="0" rtl="0">
-              <a:spcBef>
-                <a:spcPts val="0"/>
-              </a:spcBef>
-              <a:buNone/>
-            </a:pPr>
-            <a:r>
-              <a:rPr lang="en"/>
-              <a:t>Zombie games are unlikely to be rated higher than average, but (probably) do get more fans (1.27e-10)</a:t>
+              <a:t>Again, visible here is the strong correlation between # Votes, # Comments, and Rank</a:t>
             </a:r>
           </a:p>
         </p:txBody>
@@ -1197,7 +1257,31 @@
             </a:pPr>
             <a:r>
               <a:rPr lang="en"/>
-              <a:t>While some mechanics are likely to increase rating, votes, and comments, but not fans. Things that are likely to increase fans are also likely to increase the others</a:t>
+              <a:t>Ran two-sample t.test against rest of games for each category</a:t>
+            </a:r>
+          </a:p>
+          <a:p>
+            <a:pPr lvl="0">
+              <a:spcBef>
+                <a:spcPts val="0"/>
+              </a:spcBef>
+              <a:buNone/>
+            </a:pPr>
+            <a:r>
+              <a:rPr lang="en"/>
+              <a:t>War games not likely to get more fans, votes, or comments than average despite higher ratings</a:t>
+            </a:r>
+          </a:p>
+          <a:p>
+            <a:pPr lvl="0">
+              <a:spcBef>
+                <a:spcPts val="0"/>
+              </a:spcBef>
+              <a:buNone/>
+            </a:pPr>
+            <a:r>
+              <a:rPr lang="en"/>
+              <a:t>Building includes economic games and political games, where you “build up” something</a:t>
             </a:r>
           </a:p>
           <a:p>
@@ -1213,7 +1297,7 @@
             <a:endParaRPr/>
           </a:p>
           <a:p>
-            <a:pPr lvl="0">
+            <a:pPr lvl="0" rtl="0">
               <a:spcBef>
                 <a:spcPts val="0"/>
               </a:spcBef>
@@ -1221,7 +1305,7 @@
             </a:pPr>
             <a:r>
               <a:rPr lang="en"/>
-              <a:t>Don’t make a game with a performance aspect though, people don’t like that. It shows up in all analysis I’ve done. I did simple ordering based on votes and ratings, and then this t.test, and performance is always low</a:t>
+              <a:t>Zombie games are unlikely to be rated higher than average, but (probably) do get more fans (1.27e-10)</a:t>
             </a:r>
           </a:p>
         </p:txBody>
@@ -1316,7 +1400,7 @@
             </a:pPr>
             <a:r>
               <a:rPr lang="en"/>
-              <a:t>How often people get rid of games, either through sale trade etc</a:t>
+              <a:t>While some mechanics are likely to increase rating, votes, and comments, but not fans. Things that are likely to increase fans are also likely to increase the others</a:t>
             </a:r>
           </a:p>
           <a:p>
@@ -1327,8 +1411,20 @@
               <a:buNone/>
             </a:pPr>
             <a:r>
+              <a:t/>
+            </a:r>
+            <a:endParaRPr/>
+          </a:p>
+          <a:p>
+            <a:pPr lvl="0">
+              <a:spcBef>
+                <a:spcPts val="0"/>
+              </a:spcBef>
+              <a:buNone/>
+            </a:pPr>
+            <a:r>
               <a:rPr lang="en"/>
-              <a:t>This information was from own vs prev-owned</a:t>
+              <a:t>Don’t make a game with a performance aspect though, people don’t like that. It shows up in all analysis I’ve done. I did simple ordering based on votes and ratings, and then this t.test, and performance is always low</a:t>
             </a:r>
           </a:p>
         </p:txBody>
@@ -5489,6 +5585,95 @@
 </p:sld>
 </file>
 
+<file path=ppt/slides/slide10.xml><?xml version="1.0" encoding="utf-8"?>
+<p:sld xmlns:a="http://schemas.openxmlformats.org/drawingml/2006/main" xmlns:r="http://schemas.openxmlformats.org/officeDocument/2006/relationships" xmlns:mc="http://schemas.openxmlformats.org/markup-compatibility/2006" xmlns:mv="urn:schemas-microsoft-com:mac:vml" xmlns:p="http://schemas.openxmlformats.org/presentationml/2006/main" xmlns:c="http://schemas.openxmlformats.org/drawingml/2006/chart" xmlns:dgm="http://schemas.openxmlformats.org/drawingml/2006/diagram" xmlns:o="urn:schemas-microsoft-com:office:office" xmlns:v="urn:schemas-microsoft-com:vml" xmlns:pvml="urn:schemas-microsoft-com:office:powerpoint" xmlns:com="http://schemas.openxmlformats.org/drawingml/2006/compatibility" xmlns:p14="http://schemas.microsoft.com/office/powerpoint/2010/main">
+  <p:cSld>
+    <p:spTree>
+      <p:nvGrpSpPr>
+        <p:cNvPr id="112" name="Shape 112"/>
+        <p:cNvGrpSpPr/>
+        <p:nvPr/>
+      </p:nvGrpSpPr>
+      <p:grpSpPr>
+        <a:xfrm>
+          <a:off x="0" y="0"/>
+          <a:ext cx="0" cy="0"/>
+          <a:chOff x="0" y="0"/>
+          <a:chExt cx="0" cy="0"/>
+        </a:xfrm>
+      </p:grpSpPr>
+      <p:sp>
+        <p:nvSpPr>
+          <p:cNvPr id="113" name="Shape 113"/>
+          <p:cNvSpPr txBox="1"/>
+          <p:nvPr>
+            <p:ph type="title"/>
+          </p:nvPr>
+        </p:nvSpPr>
+        <p:spPr>
+          <a:xfrm>
+            <a:off x="311700" y="391350"/>
+            <a:ext cx="8520600" cy="626100"/>
+          </a:xfrm>
+          <a:prstGeom prst="rect">
+            <a:avLst/>
+          </a:prstGeom>
+        </p:spPr>
+        <p:txBody>
+          <a:bodyPr anchorCtr="0" anchor="t" bIns="91425" lIns="91425" rIns="91425" tIns="91425">
+            <a:noAutofit/>
+          </a:bodyPr>
+          <a:lstStyle/>
+          <a:p>
+            <a:pPr lvl="0">
+              <a:spcBef>
+                <a:spcPts val="0"/>
+              </a:spcBef>
+              <a:buNone/>
+            </a:pPr>
+            <a:r>
+              <a:rPr lang="en"/>
+              <a:t>Non-Retention Rate</a:t>
+            </a:r>
+          </a:p>
+        </p:txBody>
+      </p:sp>
+      <p:pic>
+        <p:nvPicPr>
+          <p:cNvPr descr="non_retention.png" id="114" name="Shape 114"/>
+          <p:cNvPicPr preferRelativeResize="0"/>
+          <p:nvPr/>
+        </p:nvPicPr>
+        <p:blipFill>
+          <a:blip r:embed="rId3">
+            <a:alphaModFix/>
+          </a:blip>
+          <a:stretch>
+            <a:fillRect/>
+          </a:stretch>
+        </p:blipFill>
+        <p:spPr>
+          <a:xfrm>
+            <a:off x="2618727" y="1169850"/>
+            <a:ext cx="3906544" cy="3821249"/>
+          </a:xfrm>
+          <a:prstGeom prst="rect">
+            <a:avLst/>
+          </a:prstGeom>
+          <a:noFill/>
+          <a:ln>
+            <a:noFill/>
+          </a:ln>
+        </p:spPr>
+      </p:pic>
+    </p:spTree>
+  </p:cSld>
+  <p:clrMapOvr>
+    <a:masterClrMapping/>
+  </p:clrMapOvr>
+</p:sld>
+</file>
+
 <file path=ppt/slides/slide2.xml><?xml version="1.0" encoding="utf-8"?>
 <p:sld xmlns:a="http://schemas.openxmlformats.org/drawingml/2006/main" xmlns:r="http://schemas.openxmlformats.org/officeDocument/2006/relationships" xmlns:mc="http://schemas.openxmlformats.org/markup-compatibility/2006" xmlns:mv="urn:schemas-microsoft-com:mac:vml" xmlns:p="http://schemas.openxmlformats.org/presentationml/2006/main" xmlns:c="http://schemas.openxmlformats.org/drawingml/2006/chart" xmlns:dgm="http://schemas.openxmlformats.org/drawingml/2006/diagram" xmlns:o="urn:schemas-microsoft-com:office:office" xmlns:v="urn:schemas-microsoft-com:vml" xmlns:pvml="urn:schemas-microsoft-com:office:powerpoint" xmlns:com="http://schemas.openxmlformats.org/drawingml/2006/compatibility" xmlns:p14="http://schemas.microsoft.com/office/powerpoint/2010/main">
   <p:cSld>
@@ -5537,14 +5722,14 @@
             </a:pPr>
             <a:r>
               <a:rPr lang="en"/>
-              <a:t>Introduction - Game Page Example</a:t>
+              <a:t>Introduction - Search Page Example</a:t>
             </a:r>
           </a:p>
         </p:txBody>
       </p:sp>
       <p:pic>
         <p:nvPicPr>
-          <p:cNvPr descr="GamePageExample.PNG" id="66" name="Shape 66"/>
+          <p:cNvPr descr="searchpageexample.PNG" id="66" name="Shape 66"/>
           <p:cNvPicPr preferRelativeResize="0"/>
           <p:nvPr/>
         </p:nvPicPr>
@@ -5618,7 +5803,7 @@
           </a:bodyPr>
           <a:lstStyle/>
           <a:p>
-            <a:pPr lvl="0">
+            <a:pPr lvl="0" rtl="0">
               <a:spcBef>
                 <a:spcPts val="0"/>
               </a:spcBef>
@@ -5626,14 +5811,14 @@
             </a:pPr>
             <a:r>
               <a:rPr lang="en"/>
-              <a:t>Game Feature Correlation</a:t>
+              <a:t>Introduction - Game Page Example</a:t>
             </a:r>
           </a:p>
         </p:txBody>
       </p:sp>
       <p:pic>
         <p:nvPicPr>
-          <p:cNvPr descr="corrplot_game.png" id="72" name="Shape 72"/>
+          <p:cNvPr descr="GamePageExample.PNG" id="72" name="Shape 72"/>
           <p:cNvPicPr preferRelativeResize="0"/>
           <p:nvPr/>
         </p:nvPicPr>
@@ -5647,8 +5832,8 @@
         </p:blipFill>
         <p:spPr>
           <a:xfrm>
-            <a:off x="2618727" y="1169850"/>
-            <a:ext cx="3906544" cy="3821249"/>
+            <a:off x="975527" y="1169850"/>
+            <a:ext cx="7192944" cy="3821251"/>
           </a:xfrm>
           <a:prstGeom prst="rect">
             <a:avLst/>
@@ -5715,14 +5900,14 @@
             </a:pPr>
             <a:r>
               <a:rPr lang="en"/>
-              <a:t>Opinion Feature Correlation</a:t>
+              <a:t>Game Feature Correlation</a:t>
             </a:r>
           </a:p>
         </p:txBody>
       </p:sp>
       <p:pic>
         <p:nvPicPr>
-          <p:cNvPr descr="corrplot.png" id="78" name="Shape 78"/>
+          <p:cNvPr descr="corrplot_game.png" id="78" name="Shape 78"/>
           <p:cNvPicPr preferRelativeResize="0"/>
           <p:nvPr/>
         </p:nvPicPr>
@@ -5796,26 +5981,22 @@
           </a:bodyPr>
           <a:lstStyle/>
           <a:p>
-            <a:pPr lvl="0" rtl="0">
+            <a:pPr lvl="0">
               <a:spcBef>
                 <a:spcPts val="0"/>
               </a:spcBef>
               <a:buNone/>
             </a:pPr>
             <a:r>
-              <a:rPr lang="en" sz="3000"/>
-              <a:t>Opinion </a:t>
-            </a:r>
-            <a:r>
-              <a:rPr lang="en" sz="3000"/>
-              <a:t>Feature Correlation 2 - log10(Counts)</a:t>
+              <a:rPr lang="en"/>
+              <a:t>Opinion Feature Correlation</a:t>
             </a:r>
           </a:p>
         </p:txBody>
       </p:sp>
       <p:pic>
         <p:nvPicPr>
-          <p:cNvPr descr="corplot_loglog.png" id="84" name="Shape 84"/>
+          <p:cNvPr descr="corrplot.png" id="84" name="Shape 84"/>
           <p:cNvPicPr preferRelativeResize="0"/>
           <p:nvPr/>
         </p:nvPicPr>
@@ -5889,22 +6070,26 @@
           </a:bodyPr>
           <a:lstStyle/>
           <a:p>
-            <a:pPr lvl="0">
+            <a:pPr lvl="0" rtl="0">
               <a:spcBef>
                 <a:spcPts val="0"/>
               </a:spcBef>
               <a:buNone/>
             </a:pPr>
             <a:r>
-              <a:rPr lang="en"/>
-              <a:t>LogLog Graph of Votes vs Comments</a:t>
+              <a:rPr lang="en" sz="3000"/>
+              <a:t>Opinion </a:t>
+            </a:r>
+            <a:r>
+              <a:rPr lang="en" sz="3000"/>
+              <a:t>Feature Correlation 2 - log10(Counts)</a:t>
             </a:r>
           </a:p>
         </p:txBody>
       </p:sp>
       <p:pic>
         <p:nvPicPr>
-          <p:cNvPr descr="loglog_votes_comments.png" id="90" name="Shape 90"/>
+          <p:cNvPr descr="corplot_loglog.png" id="90" name="Shape 90"/>
           <p:cNvPicPr preferRelativeResize="0"/>
           <p:nvPr/>
         </p:nvPicPr>
@@ -5978,7 +6163,7 @@
           </a:bodyPr>
           <a:lstStyle/>
           <a:p>
-            <a:pPr lvl="0" rtl="0">
+            <a:pPr lvl="0">
               <a:spcBef>
                 <a:spcPts val="0"/>
               </a:spcBef>
@@ -5986,147 +6171,39 @@
             </a:pPr>
             <a:r>
               <a:rPr lang="en"/>
-              <a:t>Game Category Analysis</a:t>
+              <a:t>LogLog Graph of Votes vs Comments</a:t>
             </a:r>
           </a:p>
         </p:txBody>
       </p:sp>
-      <p:sp>
-        <p:nvSpPr>
-          <p:cNvPr id="96" name="Shape 96"/>
-          <p:cNvSpPr txBox="1"/>
-          <p:nvPr>
-            <p:ph idx="1" type="body"/>
-          </p:nvPr>
-        </p:nvSpPr>
-        <p:spPr>
-          <a:xfrm>
-            <a:off x="311700" y="1152475"/>
-            <a:ext cx="8520600" cy="3416400"/>
+      <p:pic>
+        <p:nvPicPr>
+          <p:cNvPr descr="loglog_votes_comments.png" id="96" name="Shape 96"/>
+          <p:cNvPicPr preferRelativeResize="0"/>
+          <p:nvPr/>
+        </p:nvPicPr>
+        <p:blipFill>
+          <a:blip r:embed="rId3">
+            <a:alphaModFix/>
+          </a:blip>
+          <a:stretch>
+            <a:fillRect/>
+          </a:stretch>
+        </p:blipFill>
+        <p:spPr>
+          <a:xfrm>
+            <a:off x="2618727" y="1169850"/>
+            <a:ext cx="3906544" cy="3821249"/>
           </a:xfrm>
           <a:prstGeom prst="rect">
             <a:avLst/>
           </a:prstGeom>
-        </p:spPr>
-        <p:txBody>
-          <a:bodyPr anchorCtr="0" anchor="t" bIns="91425" lIns="91425" rIns="91425" tIns="91425">
-            <a:noAutofit/>
-          </a:bodyPr>
-          <a:lstStyle/>
-          <a:p>
-            <a:pPr indent="-228600" lvl="0" marL="457200" marR="0" rtl="0" algn="l">
-              <a:lnSpc>
-                <a:spcPct val="115000"/>
-              </a:lnSpc>
-              <a:spcBef>
-                <a:spcPts val="0"/>
-              </a:spcBef>
-              <a:spcAft>
-                <a:spcPts val="1600"/>
-              </a:spcAft>
-              <a:buChar char="-"/>
-            </a:pPr>
-            <a:r>
-              <a:rPr lang="en"/>
-              <a:t>Noted tendencies</a:t>
-            </a:r>
-          </a:p>
-          <a:p>
-            <a:pPr indent="-228600" lvl="1" marL="914400" marR="0" rtl="0" algn="l">
-              <a:lnSpc>
-                <a:spcPct val="115000"/>
-              </a:lnSpc>
-              <a:spcBef>
-                <a:spcPts val="0"/>
-              </a:spcBef>
-              <a:spcAft>
-                <a:spcPts val="1600"/>
-              </a:spcAft>
-              <a:buChar char="-"/>
-            </a:pPr>
-            <a:r>
-              <a:rPr lang="en"/>
-              <a:t>Higher Rating: War games</a:t>
-            </a:r>
-          </a:p>
-          <a:p>
-            <a:pPr indent="-228600" lvl="1" marL="914400" marR="0" rtl="0" algn="l">
-              <a:lnSpc>
-                <a:spcPct val="115000"/>
-              </a:lnSpc>
-              <a:spcBef>
-                <a:spcPts val="0"/>
-              </a:spcBef>
-              <a:spcAft>
-                <a:spcPts val="1600"/>
-              </a:spcAft>
-              <a:buChar char="-"/>
-            </a:pPr>
-            <a:r>
-              <a:rPr lang="en"/>
-              <a:t>More fans: Thematic games (Sci-fi, horror, etc)</a:t>
-            </a:r>
-          </a:p>
-          <a:p>
-            <a:pPr indent="-228600" lvl="1" marL="914400" marR="0" rtl="0" algn="l">
-              <a:lnSpc>
-                <a:spcPct val="115000"/>
-              </a:lnSpc>
-              <a:spcBef>
-                <a:spcPts val="0"/>
-              </a:spcBef>
-              <a:spcAft>
-                <a:spcPts val="1600"/>
-              </a:spcAft>
-              <a:buChar char="-"/>
-            </a:pPr>
-            <a:r>
-              <a:rPr lang="en"/>
-              <a:t>More comments</a:t>
-            </a:r>
-            <a:r>
-              <a:rPr lang="en"/>
-              <a:t>: Building and Adventure games</a:t>
-            </a:r>
-          </a:p>
-          <a:p>
-            <a:pPr indent="-228600" lvl="1" marL="914400" marR="0" rtl="0" algn="l">
-              <a:lnSpc>
-                <a:spcPct val="115000"/>
-              </a:lnSpc>
-              <a:spcBef>
-                <a:spcPts val="0"/>
-              </a:spcBef>
-              <a:spcAft>
-                <a:spcPts val="1600"/>
-              </a:spcAft>
-              <a:buChar char="-"/>
-            </a:pPr>
-            <a:r>
-              <a:rPr lang="en"/>
-              <a:t>More votes: Building and Adventure games</a:t>
-            </a:r>
-          </a:p>
-          <a:p>
-            <a:pPr indent="-228600" lvl="2" marL="1371600" marR="0" rtl="0" algn="l">
-              <a:lnSpc>
-                <a:spcPct val="115000"/>
-              </a:lnSpc>
-              <a:spcBef>
-                <a:spcPts val="0"/>
-              </a:spcBef>
-              <a:spcAft>
-                <a:spcPts val="1600"/>
-              </a:spcAft>
-              <a:buChar char="-"/>
-            </a:pPr>
-            <a:r>
-              <a:rPr lang="en"/>
-              <a:t>Again, comments and votes are highly correlated</a:t>
-            </a:r>
-          </a:p>
-        </p:txBody>
-      </p:sp>
+          <a:noFill/>
+          <a:ln>
+            <a:noFill/>
+          </a:ln>
+        </p:spPr>
+      </p:pic>
     </p:spTree>
   </p:cSld>
   <p:clrMapOvr>
@@ -6175,7 +6252,7 @@
           </a:bodyPr>
           <a:lstStyle/>
           <a:p>
-            <a:pPr lvl="0">
+            <a:pPr lvl="0" rtl="0">
               <a:spcBef>
                 <a:spcPts val="0"/>
               </a:spcBef>
@@ -6183,7 +6260,7 @@
             </a:pPr>
             <a:r>
               <a:rPr lang="en"/>
-              <a:t>Game Mechanic Analysis</a:t>
+              <a:t>Game Category Analysis</a:t>
             </a:r>
           </a:p>
         </p:txBody>
@@ -6211,56 +6288,6 @@
           </a:bodyPr>
           <a:lstStyle/>
           <a:p>
-            <a:pPr indent="-342900" lvl="0" marL="457200" marR="0" rtl="0" algn="l">
-              <a:lnSpc>
-                <a:spcPct val="115000"/>
-              </a:lnSpc>
-              <a:spcBef>
-                <a:spcPts val="0"/>
-              </a:spcBef>
-              <a:spcAft>
-                <a:spcPts val="1600"/>
-              </a:spcAft>
-              <a:buClr>
-                <a:schemeClr val="dk2"/>
-              </a:buClr>
-              <a:buSzPct val="100000"/>
-              <a:buFont typeface="Lato"/>
-              <a:buChar char="-"/>
-            </a:pPr>
-            <a:r>
-              <a:rPr lang="en"/>
-              <a:t>Game mechanics more </a:t>
-            </a:r>
-            <a:r>
-              <a:rPr lang="en"/>
-              <a:t>varied</a:t>
-            </a:r>
-          </a:p>
-          <a:p>
-            <a:pPr indent="-342900" lvl="1" marL="914400" marR="0" rtl="0" algn="l">
-              <a:lnSpc>
-                <a:spcPct val="115000"/>
-              </a:lnSpc>
-              <a:spcBef>
-                <a:spcPts val="0"/>
-              </a:spcBef>
-              <a:spcAft>
-                <a:spcPts val="1600"/>
-              </a:spcAft>
-              <a:buClr>
-                <a:schemeClr val="dk2"/>
-              </a:buClr>
-              <a:buSzPct val="128571"/>
-              <a:buFont typeface="Lato"/>
-              <a:buChar char="-"/>
-            </a:pPr>
-            <a:r>
-              <a:rPr lang="en"/>
-              <a:t>Top mechanics not always similar</a:t>
-            </a:r>
-          </a:p>
-          <a:p>
             <a:pPr indent="-228600" lvl="0" marL="457200" marR="0" rtl="0" algn="l">
               <a:lnSpc>
                 <a:spcPct val="115000"/>
@@ -6275,7 +6302,7 @@
             </a:pPr>
             <a:r>
               <a:rPr lang="en"/>
-              <a:t>Avg. Rating, Num. Votes, Num. Comments all had basically the same top mechanics but in slightly different orders</a:t>
+              <a:t>Noted tendencies</a:t>
             </a:r>
           </a:p>
           <a:p>
@@ -6293,7 +6320,83 @@
             </a:pPr>
             <a:r>
               <a:rPr lang="en"/>
-              <a:t>Hand Management and set collection are the two most popular</a:t>
+              <a:t>Higher Rating: War games</a:t>
+            </a:r>
+          </a:p>
+          <a:p>
+            <a:pPr indent="-228600" lvl="1" marL="914400" marR="0" rtl="0" algn="l">
+              <a:lnSpc>
+                <a:spcPct val="115000"/>
+              </a:lnSpc>
+              <a:spcBef>
+                <a:spcPts val="0"/>
+              </a:spcBef>
+              <a:spcAft>
+                <a:spcPts val="1600"/>
+              </a:spcAft>
+              <a:buChar char="-"/>
+            </a:pPr>
+            <a:r>
+              <a:rPr lang="en"/>
+              <a:t>More fans: Thematic games (Sci-fi, horror, etc)</a:t>
+            </a:r>
+          </a:p>
+          <a:p>
+            <a:pPr indent="-228600" lvl="1" marL="914400" marR="0" rtl="0" algn="l">
+              <a:lnSpc>
+                <a:spcPct val="115000"/>
+              </a:lnSpc>
+              <a:spcBef>
+                <a:spcPts val="0"/>
+              </a:spcBef>
+              <a:spcAft>
+                <a:spcPts val="1600"/>
+              </a:spcAft>
+              <a:buChar char="-"/>
+            </a:pPr>
+            <a:r>
+              <a:rPr lang="en"/>
+              <a:t>More comments</a:t>
+            </a:r>
+            <a:r>
+              <a:rPr lang="en"/>
+              <a:t>: Building and Adventure games</a:t>
+            </a:r>
+          </a:p>
+          <a:p>
+            <a:pPr indent="-228600" lvl="1" marL="914400" marR="0" rtl="0" algn="l">
+              <a:lnSpc>
+                <a:spcPct val="115000"/>
+              </a:lnSpc>
+              <a:spcBef>
+                <a:spcPts val="0"/>
+              </a:spcBef>
+              <a:spcAft>
+                <a:spcPts val="1600"/>
+              </a:spcAft>
+              <a:buChar char="-"/>
+            </a:pPr>
+            <a:r>
+              <a:rPr lang="en"/>
+              <a:t>More votes: Building and Adventure games</a:t>
+            </a:r>
+          </a:p>
+          <a:p>
+            <a:pPr indent="-228600" lvl="2" marL="1371600" marR="0" rtl="0" algn="l">
+              <a:lnSpc>
+                <a:spcPct val="115000"/>
+              </a:lnSpc>
+              <a:spcBef>
+                <a:spcPts val="0"/>
+              </a:spcBef>
+              <a:spcAft>
+                <a:spcPts val="1600"/>
+              </a:spcAft>
+              <a:buChar char="-"/>
+            </a:pPr>
+            <a:r>
+              <a:rPr lang="en"/>
+              <a:t>Again, comments and votes are highly correlated</a:t>
             </a:r>
           </a:p>
         </p:txBody>
@@ -6354,39 +6457,121 @@
             </a:pPr>
             <a:r>
               <a:rPr lang="en"/>
-              <a:t>Non-Retention Rate</a:t>
+              <a:t>Game Mechanic Analysis</a:t>
             </a:r>
           </a:p>
         </p:txBody>
       </p:sp>
-      <p:pic>
-        <p:nvPicPr>
-          <p:cNvPr descr="non_retention.png" id="108" name="Shape 108"/>
-          <p:cNvPicPr preferRelativeResize="0"/>
-          <p:nvPr/>
-        </p:nvPicPr>
-        <p:blipFill>
-          <a:blip r:embed="rId3">
-            <a:alphaModFix/>
-          </a:blip>
-          <a:stretch>
-            <a:fillRect/>
-          </a:stretch>
-        </p:blipFill>
-        <p:spPr>
-          <a:xfrm>
-            <a:off x="2618727" y="1169850"/>
-            <a:ext cx="3906544" cy="3821249"/>
+      <p:sp>
+        <p:nvSpPr>
+          <p:cNvPr id="108" name="Shape 108"/>
+          <p:cNvSpPr txBox="1"/>
+          <p:nvPr>
+            <p:ph idx="1" type="body"/>
+          </p:nvPr>
+        </p:nvSpPr>
+        <p:spPr>
+          <a:xfrm>
+            <a:off x="311700" y="1152475"/>
+            <a:ext cx="8520600" cy="3416400"/>
           </a:xfrm>
           <a:prstGeom prst="rect">
             <a:avLst/>
           </a:prstGeom>
-          <a:noFill/>
-          <a:ln>
-            <a:noFill/>
-          </a:ln>
-        </p:spPr>
-      </p:pic>
+        </p:spPr>
+        <p:txBody>
+          <a:bodyPr anchorCtr="0" anchor="t" bIns="91425" lIns="91425" rIns="91425" tIns="91425">
+            <a:noAutofit/>
+          </a:bodyPr>
+          <a:lstStyle/>
+          <a:p>
+            <a:pPr indent="-342900" lvl="0" marL="457200" marR="0" rtl="0" algn="l">
+              <a:lnSpc>
+                <a:spcPct val="115000"/>
+              </a:lnSpc>
+              <a:spcBef>
+                <a:spcPts val="0"/>
+              </a:spcBef>
+              <a:spcAft>
+                <a:spcPts val="1600"/>
+              </a:spcAft>
+              <a:buClr>
+                <a:schemeClr val="dk2"/>
+              </a:buClr>
+              <a:buSzPct val="100000"/>
+              <a:buFont typeface="Lato"/>
+              <a:buChar char="-"/>
+            </a:pPr>
+            <a:r>
+              <a:rPr lang="en"/>
+              <a:t>Game mechanics more </a:t>
+            </a:r>
+            <a:r>
+              <a:rPr lang="en"/>
+              <a:t>varied</a:t>
+            </a:r>
+          </a:p>
+          <a:p>
+            <a:pPr indent="-342900" lvl="1" marL="914400" marR="0" rtl="0" algn="l">
+              <a:lnSpc>
+                <a:spcPct val="115000"/>
+              </a:lnSpc>
+              <a:spcBef>
+                <a:spcPts val="0"/>
+              </a:spcBef>
+              <a:spcAft>
+                <a:spcPts val="1600"/>
+              </a:spcAft>
+              <a:buClr>
+                <a:schemeClr val="dk2"/>
+              </a:buClr>
+              <a:buSzPct val="128571"/>
+              <a:buFont typeface="Lato"/>
+              <a:buChar char="-"/>
+            </a:pPr>
+            <a:r>
+              <a:rPr lang="en"/>
+              <a:t>Top mechanics not always similar</a:t>
+            </a:r>
+          </a:p>
+          <a:p>
+            <a:pPr indent="-228600" lvl="0" marL="457200" marR="0" rtl="0" algn="l">
+              <a:lnSpc>
+                <a:spcPct val="115000"/>
+              </a:lnSpc>
+              <a:spcBef>
+                <a:spcPts val="0"/>
+              </a:spcBef>
+              <a:spcAft>
+                <a:spcPts val="1600"/>
+              </a:spcAft>
+              <a:buChar char="-"/>
+            </a:pPr>
+            <a:r>
+              <a:rPr lang="en"/>
+              <a:t>Avg. Rating, Num. Votes, Num. Comments all had basically the same top mechanics but in slightly different orders</a:t>
+            </a:r>
+          </a:p>
+          <a:p>
+            <a:pPr indent="-228600" lvl="1" marL="914400" marR="0" rtl="0" algn="l">
+              <a:lnSpc>
+                <a:spcPct val="115000"/>
+              </a:lnSpc>
+              <a:spcBef>
+                <a:spcPts val="0"/>
+              </a:spcBef>
+              <a:spcAft>
+                <a:spcPts val="1600"/>
+              </a:spcAft>
+              <a:buChar char="-"/>
+            </a:pPr>
+            <a:r>
+              <a:rPr lang="en"/>
+              <a:t>Hand Management and set collection are the two most popular</a:t>
+            </a:r>
+          </a:p>
+        </p:txBody>
+      </p:sp>
     </p:spTree>
   </p:cSld>
   <p:clrMapOvr>
@@ -6396,6 +6581,285 @@
 </file>
 
 <file path=ppt/theme/theme1.xml><?xml version="1.0" encoding="utf-8"?>
+<a:theme xmlns:a="http://schemas.openxmlformats.org/drawingml/2006/main" xmlns:r="http://schemas.openxmlformats.org/officeDocument/2006/relationships" name="Custom Theme">
+  <a:themeElements>
+    <a:clrScheme name="Default">
+      <a:dk1>
+        <a:srgbClr val="000000"/>
+      </a:dk1>
+      <a:lt1>
+        <a:srgbClr val="FFFFFF"/>
+      </a:lt1>
+      <a:dk2>
+        <a:srgbClr val="158158"/>
+      </a:dk2>
+      <a:lt2>
+        <a:srgbClr val="F3F3F3"/>
+      </a:lt2>
+      <a:accent1>
+        <a:srgbClr val="058DC7"/>
+      </a:accent1>
+      <a:accent2>
+        <a:srgbClr val="50B432"/>
+      </a:accent2>
+      <a:accent3>
+        <a:srgbClr val="ED561B"/>
+      </a:accent3>
+      <a:accent4>
+        <a:srgbClr val="EDEF00"/>
+      </a:accent4>
+      <a:accent5>
+        <a:srgbClr val="24CBE5"/>
+      </a:accent5>
+      <a:accent6>
+        <a:srgbClr val="64E572"/>
+      </a:accent6>
+      <a:hlink>
+        <a:srgbClr val="2200CC"/>
+      </a:hlink>
+      <a:folHlink>
+        <a:srgbClr val="551A8B"/>
+      </a:folHlink>
+    </a:clrScheme>
+    <a:fontScheme name="Office">
+      <a:majorFont>
+        <a:latin typeface="Arial"/>
+        <a:ea typeface=""/>
+        <a:cs typeface=""/>
+        <a:font script="Jpan" typeface="ＭＳ Ｐゴシック"/>
+        <a:font script="Hang" typeface="맑은 고딕"/>
+        <a:font script="Hans" typeface="宋体"/>
+        <a:font script="Hant" typeface="新細明體"/>
+        <a:font script="Arab" typeface="Times New Roman"/>
+        <a:font script="Hebr" typeface="Times New Roman"/>
+        <a:font script="Thai" typeface="Angsana New"/>
+        <a:font script="Ethi" typeface="Nyala"/>
+        <a:font script="Beng" typeface="Vrinda"/>
+        <a:font script="Gujr" typeface="Shruti"/>
+        <a:font script="Khmr" typeface="MoolBoran"/>
+        <a:font script="Knda" typeface="Tunga"/>
+        <a:font script="Guru" typeface="Raavi"/>
+        <a:font script="Cans" typeface="Euphemia"/>
+        <a:font script="Cher" typeface="Plantagenet Cherokee"/>
+        <a:font script="Yiii" typeface="Microsoft Yi Baiti"/>
+        <a:font script="Tibt" typeface="Microsoft Himalaya"/>
+        <a:font script="Thaa" typeface="MV Boli"/>
+        <a:font script="Deva" typeface="Mangal"/>
+        <a:font script="Telu" typeface="Gautami"/>
+        <a:font script="Taml" typeface="Latha"/>
+        <a:font script="Syrc" typeface="Estrangelo Edessa"/>
+        <a:font script="Orya" typeface="Kalinga"/>
+        <a:font script="Mlym" typeface="Kartika"/>
+        <a:font script="Laoo" typeface="DokChampa"/>
+        <a:font script="Sinh" typeface="Iskoola Pota"/>
+        <a:font script="Mong" typeface="Mongolian Baiti"/>
+        <a:font script="Viet" typeface="Times New Roman"/>
+        <a:font script="Uigh" typeface="Microsoft Uighur"/>
+        <a:font script="Geor" typeface="Sylfaen"/>
+      </a:majorFont>
+      <a:minorFont>
+        <a:latin typeface="Arial"/>
+        <a:ea typeface=""/>
+        <a:cs typeface=""/>
+        <a:font script="Jpan" typeface="ＭＳ Ｐゴシック"/>
+        <a:font script="Hang" typeface="맑은 고딕"/>
+        <a:font script="Hans" typeface="宋体"/>
+        <a:font script="Hant" typeface="新細明體"/>
+        <a:font script="Arab" typeface="Arial"/>
+        <a:font script="Hebr" typeface="Arial"/>
+        <a:font script="Thai" typeface="Cordia New"/>
+        <a:font script="Ethi" typeface="Nyala"/>
+        <a:font script="Beng" typeface="Vrinda"/>
+        <a:font script="Gujr" typeface="Shruti"/>
+        <a:font script="Khmr" typeface="DaunPenh"/>
+        <a:font script="Knda" typeface="Tunga"/>
+        <a:font script="Guru" typeface="Raavi"/>
+        <a:font script="Cans" typeface="Euphemia"/>
+        <a:font script="Cher" typeface="Plantagenet Cherokee"/>
+        <a:font script="Yiii" typeface="Microsoft Yi Baiti"/>
+        <a:font script="Tibt" typeface="Microsoft Himalaya"/>
+        <a:font script="Thaa" typeface="MV Boli"/>
+        <a:font script="Deva" typeface="Mangal"/>
+        <a:font script="Telu" typeface="Gautami"/>
+        <a:font script="Taml" typeface="Latha"/>
+        <a:font script="Syrc" typeface="Estrangelo Edessa"/>
+        <a:font script="Orya" typeface="Kalinga"/>
+        <a:font script="Mlym" typeface="Kartika"/>
+        <a:font script="Laoo" typeface="DokChampa"/>
+        <a:font script="Sinh" typeface="Iskoola Pota"/>
+        <a:font script="Mong" typeface="Mongolian Baiti"/>
+        <a:font script="Viet" typeface="Arial"/>
+        <a:font script="Uigh" typeface="Microsoft Uighur"/>
+        <a:font script="Geor" typeface="Sylfaen"/>
+      </a:minorFont>
+    </a:fontScheme>
+    <a:fmtScheme name="Office">
+      <a:fillStyleLst>
+        <a:solidFill>
+          <a:schemeClr val="phClr"/>
+        </a:solidFill>
+        <a:gradFill rotWithShape="1">
+          <a:gsLst>
+            <a:gs pos="0">
+              <a:schemeClr val="phClr">
+                <a:tint val="50000"/>
+                <a:satMod val="300000"/>
+              </a:schemeClr>
+            </a:gs>
+            <a:gs pos="35000">
+              <a:schemeClr val="phClr">
+                <a:tint val="37000"/>
+                <a:satMod val="300000"/>
+              </a:schemeClr>
+            </a:gs>
+            <a:gs pos="100000">
+              <a:schemeClr val="phClr">
+                <a:tint val="15000"/>
+                <a:satMod val="350000"/>
+              </a:schemeClr>
+            </a:gs>
+          </a:gsLst>
+          <a:lin ang="16200000" scaled="1"/>
+        </a:gradFill>
+        <a:gradFill rotWithShape="1">
+          <a:gsLst>
+            <a:gs pos="0">
+              <a:schemeClr val="phClr">
+                <a:tint val="100000"/>
+                <a:shade val="100000"/>
+                <a:satMod val="130000"/>
+              </a:schemeClr>
+            </a:gs>
+            <a:gs pos="100000">
+              <a:schemeClr val="phClr">
+                <a:tint val="50000"/>
+                <a:shade val="100000"/>
+                <a:satMod val="350000"/>
+              </a:schemeClr>
+            </a:gs>
+          </a:gsLst>
+          <a:lin ang="16200000" scaled="0"/>
+        </a:gradFill>
+      </a:fillStyleLst>
+      <a:lnStyleLst>
+        <a:ln w="9525" cap="flat" cmpd="sng" algn="ctr">
+          <a:solidFill>
+            <a:schemeClr val="phClr">
+              <a:shade val="95000"/>
+              <a:satMod val="105000"/>
+            </a:schemeClr>
+          </a:solidFill>
+          <a:prstDash val="solid"/>
+        </a:ln>
+        <a:ln w="25400" cap="flat" cmpd="sng" algn="ctr">
+          <a:solidFill>
+            <a:schemeClr val="phClr"/>
+          </a:solidFill>
+          <a:prstDash val="solid"/>
+        </a:ln>
+        <a:ln w="38100" cap="flat" cmpd="sng" algn="ctr">
+          <a:solidFill>
+            <a:schemeClr val="phClr"/>
+          </a:solidFill>
+          <a:prstDash val="solid"/>
+        </a:ln>
+      </a:lnStyleLst>
+      <a:effectStyleLst>
+        <a:effectStyle>
+          <a:effectLst>
+            <a:outerShdw blurRad="40000" dist="20000" dir="5400000" rotWithShape="0">
+              <a:srgbClr val="000000">
+                <a:alpha val="38000"/>
+              </a:srgbClr>
+            </a:outerShdw>
+          </a:effectLst>
+        </a:effectStyle>
+        <a:effectStyle>
+          <a:effectLst>
+            <a:outerShdw blurRad="40000" dist="23000" dir="5400000" rotWithShape="0">
+              <a:srgbClr val="000000">
+                <a:alpha val="35000"/>
+              </a:srgbClr>
+            </a:outerShdw>
+          </a:effectLst>
+        </a:effectStyle>
+        <a:effectStyle>
+          <a:effectLst>
+            <a:outerShdw blurRad="40000" dist="23000" dir="5400000" rotWithShape="0">
+              <a:srgbClr val="000000">
+                <a:alpha val="35000"/>
+              </a:srgbClr>
+            </a:outerShdw>
+          </a:effectLst>
+          <a:scene3d>
+            <a:camera prst="orthographicFront">
+              <a:rot lat="0" lon="0" rev="0"/>
+            </a:camera>
+            <a:lightRig rig="threePt" dir="t">
+              <a:rot lat="0" lon="0" rev="1200000"/>
+            </a:lightRig>
+          </a:scene3d>
+          <a:sp3d>
+            <a:bevelT w="63500" h="25400"/>
+          </a:sp3d>
+        </a:effectStyle>
+      </a:effectStyleLst>
+      <a:bgFillStyleLst>
+        <a:solidFill>
+          <a:schemeClr val="phClr"/>
+        </a:solidFill>
+        <a:gradFill rotWithShape="1">
+          <a:gsLst>
+            <a:gs pos="0">
+              <a:schemeClr val="phClr">
+                <a:tint val="40000"/>
+                <a:satMod val="350000"/>
+              </a:schemeClr>
+            </a:gs>
+            <a:gs pos="40000">
+              <a:schemeClr val="phClr">
+                <a:tint val="45000"/>
+                <a:shade val="99000"/>
+                <a:satMod val="350000"/>
+              </a:schemeClr>
+            </a:gs>
+            <a:gs pos="100000">
+              <a:schemeClr val="phClr">
+                <a:shade val="20000"/>
+                <a:satMod val="255000"/>
+              </a:schemeClr>
+            </a:gs>
+          </a:gsLst>
+          <a:path path="circle">
+            <a:fillToRect l="50000" t="-80000" r="50000" b="180000"/>
+          </a:path>
+        </a:gradFill>
+        <a:gradFill rotWithShape="1">
+          <a:gsLst>
+            <a:gs pos="0">
+              <a:schemeClr val="phClr">
+                <a:tint val="80000"/>
+                <a:satMod val="300000"/>
+              </a:schemeClr>
+            </a:gs>
+            <a:gs pos="100000">
+              <a:schemeClr val="phClr">
+                <a:shade val="30000"/>
+                <a:satMod val="200000"/>
+              </a:schemeClr>
+            </a:gs>
+          </a:gsLst>
+          <a:path path="circle">
+            <a:fillToRect l="50000" t="50000" r="50000" b="50000"/>
+          </a:path>
+        </a:gradFill>
+      </a:bgFillStyleLst>
+    </a:fmtScheme>
+  </a:themeElements>
+</a:theme>
+</file>
+
+<file path=ppt/theme/theme2.xml><?xml version="1.0" encoding="utf-8"?>
 <a:theme xmlns:a="http://schemas.openxmlformats.org/drawingml/2006/main" xmlns:r="http://schemas.openxmlformats.org/officeDocument/2006/relationships" name="coral">
   <a:themeElements>
     <a:clrScheme name="Coral">
@@ -6672,283 +7136,4 @@
     </a:fmtScheme>
   </a:themeElements>
 </a:theme>
-</file>
-
-<file path=ppt/theme/theme2.xml><?xml version="1.0" encoding="utf-8"?>
-<a:theme xmlns:a="http://schemas.openxmlformats.org/drawingml/2006/main" xmlns:r="http://schemas.openxmlformats.org/officeDocument/2006/relationships" name="Custom Theme">
-  <a:themeElements>
-    <a:clrScheme name="Default">
-      <a:dk1>
-        <a:srgbClr val="000000"/>
-      </a:dk1>
-      <a:lt1>
-        <a:srgbClr val="FFFFFF"/>
-      </a:lt1>
-      <a:dk2>
-        <a:srgbClr val="158158"/>
-      </a:dk2>
-      <a:lt2>
-        <a:srgbClr val="F3F3F3"/>
-      </a:lt2>
-      <a:accent1>
-        <a:srgbClr val="058DC7"/>
-      </a:accent1>
-      <a:accent2>
-        <a:srgbClr val="50B432"/>
-      </a:accent2>
-      <a:accent3>
-        <a:srgbClr val="ED561B"/>
-      </a:accent3>
-      <a:accent4>
-        <a:srgbClr val="EDEF00"/>
-      </a:accent4>
-      <a:accent5>
-        <a:srgbClr val="24CBE5"/>
-      </a:accent5>
-      <a:accent6>
-        <a:srgbClr val="64E572"/>
-      </a:accent6>
-      <a:hlink>
-        <a:srgbClr val="2200CC"/>
-      </a:hlink>
-      <a:folHlink>
-        <a:srgbClr val="551A8B"/>
-      </a:folHlink>
-    </a:clrScheme>
-    <a:fontScheme name="Office">
-      <a:majorFont>
-        <a:latin typeface="Arial"/>
-        <a:ea typeface=""/>
-        <a:cs typeface=""/>
-        <a:font script="Jpan" typeface="ＭＳ Ｐゴシック"/>
-        <a:font script="Hang" typeface="맑은 고딕"/>
-        <a:font script="Hans" typeface="宋体"/>
-        <a:font script="Hant" typeface="新細明體"/>
-        <a:font script="Arab" typeface="Times New Roman"/>
-        <a:font script="Hebr" typeface="Times New Roman"/>
-        <a:font script="Thai" typeface="Angsana New"/>
-        <a:font script="Ethi" typeface="Nyala"/>
-        <a:font script="Beng" typeface="Vrinda"/>
-        <a:font script="Gujr" typeface="Shruti"/>
-        <a:font script="Khmr" typeface="MoolBoran"/>
-        <a:font script="Knda" typeface="Tunga"/>
-        <a:font script="Guru" typeface="Raavi"/>
-        <a:font script="Cans" typeface="Euphemia"/>
-        <a:font script="Cher" typeface="Plantagenet Cherokee"/>
-        <a:font script="Yiii" typeface="Microsoft Yi Baiti"/>
-        <a:font script="Tibt" typeface="Microsoft Himalaya"/>
-        <a:font script="Thaa" typeface="MV Boli"/>
-        <a:font script="Deva" typeface="Mangal"/>
-        <a:font script="Telu" typeface="Gautami"/>
-        <a:font script="Taml" typeface="Latha"/>
-        <a:font script="Syrc" typeface="Estrangelo Edessa"/>
-        <a:font script="Orya" typeface="Kalinga"/>
-        <a:font script="Mlym" typeface="Kartika"/>
-        <a:font script="Laoo" typeface="DokChampa"/>
-        <a:font script="Sinh" typeface="Iskoola Pota"/>
-        <a:font script="Mong" typeface="Mongolian Baiti"/>
-        <a:font script="Viet" typeface="Times New Roman"/>
-        <a:font script="Uigh" typeface="Microsoft Uighur"/>
-        <a:font script="Geor" typeface="Sylfaen"/>
-      </a:majorFont>
-      <a:minorFont>
-        <a:latin typeface="Arial"/>
-        <a:ea typeface=""/>
-        <a:cs typeface=""/>
-        <a:font script="Jpan" typeface="ＭＳ Ｐゴシック"/>
-        <a:font script="Hang" typeface="맑은 고딕"/>
-        <a:font script="Hans" typeface="宋体"/>
-        <a:font script="Hant" typeface="新細明體"/>
-        <a:font script="Arab" typeface="Arial"/>
-        <a:font script="Hebr" typeface="Arial"/>
-        <a:font script="Thai" typeface="Cordia New"/>
-        <a:font script="Ethi" typeface="Nyala"/>
-        <a:font script="Beng" typeface="Vrinda"/>
-        <a:font script="Gujr" typeface="Shruti"/>
-        <a:font script="Khmr" typeface="DaunPenh"/>
-        <a:font script="Knda" typeface="Tunga"/>
-        <a:font script="Guru" typeface="Raavi"/>
-        <a:font script="Cans" typeface="Euphemia"/>
-        <a:font script="Cher" typeface="Plantagenet Cherokee"/>
-        <a:font script="Yiii" typeface="Microsoft Yi Baiti"/>
-        <a:font script="Tibt" typeface="Microsoft Himalaya"/>
-        <a:font script="Thaa" typeface="MV Boli"/>
-        <a:font script="Deva" typeface="Mangal"/>
-        <a:font script="Telu" typeface="Gautami"/>
-        <a:font script="Taml" typeface="Latha"/>
-        <a:font script="Syrc" typeface="Estrangelo Edessa"/>
-        <a:font script="Orya" typeface="Kalinga"/>
-        <a:font script="Mlym" typeface="Kartika"/>
-        <a:font script="Laoo" typeface="DokChampa"/>
-        <a:font script="Sinh" typeface="Iskoola Pota"/>
-        <a:font script="Mong" typeface="Mongolian Baiti"/>
-        <a:font script="Viet" typeface="Arial"/>
-        <a:font script="Uigh" typeface="Microsoft Uighur"/>
-        <a:font script="Geor" typeface="Sylfaen"/>
-      </a:minorFont>
-    </a:fontScheme>
-    <a:fmtScheme name="Office">
-      <a:fillStyleLst>
-        <a:solidFill>
-          <a:schemeClr val="phClr"/>
-        </a:solidFill>
-        <a:gradFill rotWithShape="1">
-          <a:gsLst>
-            <a:gs pos="0">
-              <a:schemeClr val="phClr">
-                <a:tint val="50000"/>
-                <a:satMod val="300000"/>
-              </a:schemeClr>
-            </a:gs>
-            <a:gs pos="35000">
-              <a:schemeClr val="phClr">
-                <a:tint val="37000"/>
-                <a:satMod val="300000"/>
-              </a:schemeClr>
-            </a:gs>
-            <a:gs pos="100000">
-              <a:schemeClr val="phClr">
-                <a:tint val="15000"/>
-                <a:satMod val="350000"/>
-              </a:schemeClr>
-            </a:gs>
-          </a:gsLst>
-          <a:lin ang="16200000" scaled="1"/>
-        </a:gradFill>
-        <a:gradFill rotWithShape="1">
-          <a:gsLst>
-            <a:gs pos="0">
-              <a:schemeClr val="phClr">
-                <a:tint val="100000"/>
-                <a:shade val="100000"/>
-                <a:satMod val="130000"/>
-              </a:schemeClr>
-            </a:gs>
-            <a:gs pos="100000">
-              <a:schemeClr val="phClr">
-                <a:tint val="50000"/>
-                <a:shade val="100000"/>
-                <a:satMod val="350000"/>
-              </a:schemeClr>
-            </a:gs>
-          </a:gsLst>
-          <a:lin ang="16200000" scaled="0"/>
-        </a:gradFill>
-      </a:fillStyleLst>
-      <a:lnStyleLst>
-        <a:ln w="9525" cap="flat" cmpd="sng" algn="ctr">
-          <a:solidFill>
-            <a:schemeClr val="phClr">
-              <a:shade val="95000"/>
-              <a:satMod val="105000"/>
-            </a:schemeClr>
-          </a:solidFill>
-          <a:prstDash val="solid"/>
-        </a:ln>
-        <a:ln w="25400" cap="flat" cmpd="sng" algn="ctr">
-          <a:solidFill>
-            <a:schemeClr val="phClr"/>
-          </a:solidFill>
-          <a:prstDash val="solid"/>
-        </a:ln>
-        <a:ln w="38100" cap="flat" cmpd="sng" algn="ctr">
-          <a:solidFill>
-            <a:schemeClr val="phClr"/>
-          </a:solidFill>
-          <a:prstDash val="solid"/>
-        </a:ln>
-      </a:lnStyleLst>
-      <a:effectStyleLst>
-        <a:effectStyle>
-          <a:effectLst>
-            <a:outerShdw blurRad="40000" dist="20000" dir="5400000" rotWithShape="0">
-              <a:srgbClr val="000000">
-                <a:alpha val="38000"/>
-              </a:srgbClr>
-            </a:outerShdw>
-          </a:effectLst>
-        </a:effectStyle>
-        <a:effectStyle>
-          <a:effectLst>
-            <a:outerShdw blurRad="40000" dist="23000" dir="5400000" rotWithShape="0">
-              <a:srgbClr val="000000">
-                <a:alpha val="35000"/>
-              </a:srgbClr>
-            </a:outerShdw>
-          </a:effectLst>
-        </a:effectStyle>
-        <a:effectStyle>
-          <a:effectLst>
-            <a:outerShdw blurRad="40000" dist="23000" dir="5400000" rotWithShape="0">
-              <a:srgbClr val="000000">
-                <a:alpha val="35000"/>
-              </a:srgbClr>
-            </a:outerShdw>
-          </a:effectLst>
-          <a:scene3d>
-            <a:camera prst="orthographicFront">
-              <a:rot lat="0" lon="0" rev="0"/>
-            </a:camera>
-            <a:lightRig rig="threePt" dir="t">
-              <a:rot lat="0" lon="0" rev="1200000"/>
-            </a:lightRig>
-          </a:scene3d>
-          <a:sp3d>
-            <a:bevelT w="63500" h="25400"/>
-          </a:sp3d>
-        </a:effectStyle>
-      </a:effectStyleLst>
-      <a:bgFillStyleLst>
-        <a:solidFill>
-          <a:schemeClr val="phClr"/>
-        </a:solidFill>
-        <a:gradFill rotWithShape="1">
-          <a:gsLst>
-            <a:gs pos="0">
-              <a:schemeClr val="phClr">
-                <a:tint val="40000"/>
-                <a:satMod val="350000"/>
-              </a:schemeClr>
-            </a:gs>
-            <a:gs pos="40000">
-              <a:schemeClr val="phClr">
-                <a:tint val="45000"/>
-                <a:shade val="99000"/>
-                <a:satMod val="350000"/>
-              </a:schemeClr>
-            </a:gs>
-            <a:gs pos="100000">
-              <a:schemeClr val="phClr">
-                <a:shade val="20000"/>
-                <a:satMod val="255000"/>
-              </a:schemeClr>
-            </a:gs>
-          </a:gsLst>
-          <a:path path="circle">
-            <a:fillToRect l="50000" t="-80000" r="50000" b="180000"/>
-          </a:path>
-        </a:gradFill>
-        <a:gradFill rotWithShape="1">
-          <a:gsLst>
-            <a:gs pos="0">
-              <a:schemeClr val="phClr">
-                <a:tint val="80000"/>
-                <a:satMod val="300000"/>
-              </a:schemeClr>
-            </a:gs>
-            <a:gs pos="100000">
-              <a:schemeClr val="phClr">
-                <a:shade val="30000"/>
-                <a:satMod val="200000"/>
-              </a:schemeClr>
-            </a:gs>
-          </a:gsLst>
-          <a:path path="circle">
-            <a:fillToRect l="50000" t="50000" r="50000" b="50000"/>
-          </a:path>
-        </a:gradFill>
-      </a:bgFillStyleLst>
-    </a:fmtScheme>
-  </a:themeElements>
-</a:theme>
 </file>
</xml_diff>